<commit_message>
Updated the developer's guide
</commit_message>
<xml_diff>
--- a/docs/diagrams/StatisticParserActivityDiagram.pptx
+++ b/docs/diagrams/StatisticParserActivityDiagram.pptx
@@ -3349,10 +3349,10 @@
       </p:grpSpPr>
       <p:grpSp>
         <p:nvGrpSpPr>
-          <p:cNvPr id="132" name="Group 131">
-            <a:extLst>
-              <a:ext uri="{FF2B5EF4-FFF2-40B4-BE49-F238E27FC236}">
-                <a16:creationId xmlns:a16="http://schemas.microsoft.com/office/drawing/2014/main" id="{DE958A52-1930-4510-A09C-FBE6049E251C}"/>
+          <p:cNvPr id="2" name="Group 1">
+            <a:extLst>
+              <a:ext uri="{FF2B5EF4-FFF2-40B4-BE49-F238E27FC236}">
+                <a16:creationId xmlns:a16="http://schemas.microsoft.com/office/drawing/2014/main" id="{BACED47C-A7AE-4CAC-AAD2-8C6DC0CFF008}"/>
               </a:ext>
             </a:extLst>
           </p:cNvPr>
@@ -3361,10 +3361,10 @@
         </p:nvGrpSpPr>
         <p:grpSpPr>
           <a:xfrm>
-            <a:off x="1288296" y="-3044351"/>
-            <a:ext cx="7889676" cy="13827919"/>
-            <a:chOff x="815856" y="-3288191"/>
-            <a:chExt cx="7889676" cy="13827919"/>
+            <a:off x="1303830" y="-3093654"/>
+            <a:ext cx="7058535" cy="13045308"/>
+            <a:chOff x="1305920" y="-3151031"/>
+            <a:chExt cx="8008103" cy="14035481"/>
           </a:xfrm>
         </p:grpSpPr>
         <p:sp>
@@ -3381,8 +3381,8 @@
           </p:nvSpPr>
           <p:spPr>
             <a:xfrm>
-              <a:off x="815856" y="-2569536"/>
-              <a:ext cx="7889676" cy="12479771"/>
+              <a:off x="1305920" y="-2485812"/>
+              <a:ext cx="8008103" cy="12667097"/>
             </a:xfrm>
             <a:prstGeom prst="roundRect">
               <a:avLst/>
@@ -3412,7 +3412,7 @@
             <a:lstStyle/>
             <a:p>
               <a:pPr algn="ctr"/>
-              <a:endParaRPr lang="en-SG" dirty="0"/>
+              <a:endParaRPr lang="en-SG" sz="1200" dirty="0"/>
             </a:p>
           </p:txBody>
         </p:sp>
@@ -3430,8 +3430,8 @@
           </p:nvSpPr>
           <p:spPr>
             <a:xfrm>
-              <a:off x="4584848" y="-3288191"/>
-              <a:ext cx="175846" cy="175846"/>
+              <a:off x="5113862" y="-3151031"/>
+              <a:ext cx="178486" cy="178486"/>
             </a:xfrm>
             <a:prstGeom prst="ellipse">
               <a:avLst/>
@@ -3476,8 +3476,8 @@
           </p:nvSpPr>
           <p:spPr>
             <a:xfrm>
-              <a:off x="3485321" y="-2459174"/>
-              <a:ext cx="2374901" cy="579120"/>
+              <a:off x="3997831" y="-2309570"/>
+              <a:ext cx="2410549" cy="587813"/>
             </a:xfrm>
             <a:prstGeom prst="roundRect">
               <a:avLst/>
@@ -3553,8 +3553,8 @@
           </p:nvCxnSpPr>
           <p:spPr>
             <a:xfrm>
-              <a:off x="4672771" y="-3112345"/>
-              <a:ext cx="1" cy="653171"/>
+              <a:off x="5203105" y="-2972545"/>
+              <a:ext cx="1" cy="662975"/>
             </a:xfrm>
             <a:prstGeom prst="straightConnector1">
               <a:avLst/>
@@ -3592,8 +3592,8 @@
           </p:nvSpPr>
           <p:spPr>
             <a:xfrm>
-              <a:off x="3485319" y="-363712"/>
-              <a:ext cx="2374901" cy="579120"/>
+              <a:off x="3997829" y="-182655"/>
+              <a:ext cx="2410549" cy="587813"/>
             </a:xfrm>
             <a:prstGeom prst="roundRect">
               <a:avLst/>
@@ -3653,8 +3653,8 @@
           </p:nvSpPr>
           <p:spPr>
             <a:xfrm>
-              <a:off x="4485935" y="-1144287"/>
-              <a:ext cx="373671" cy="471054"/>
+              <a:off x="5013464" y="-974946"/>
+              <a:ext cx="379280" cy="478125"/>
             </a:xfrm>
             <a:prstGeom prst="diamond">
               <a:avLst/>
@@ -3703,8 +3703,8 @@
           </p:nvCxnSpPr>
           <p:spPr>
             <a:xfrm flipH="1">
-              <a:off x="4672771" y="-1880054"/>
-              <a:ext cx="1" cy="735767"/>
+              <a:off x="5203105" y="-1721757"/>
+              <a:ext cx="1" cy="746811"/>
             </a:xfrm>
             <a:prstGeom prst="straightConnector1">
               <a:avLst/>
@@ -3746,8 +3746,8 @@
           </p:nvCxnSpPr>
           <p:spPr>
             <a:xfrm>
-              <a:off x="4859606" y="-908760"/>
-              <a:ext cx="2293619" cy="0"/>
+              <a:off x="5392744" y="-735884"/>
+              <a:ext cx="2328047" cy="0"/>
             </a:xfrm>
             <a:prstGeom prst="straightConnector1">
               <a:avLst/>
@@ -3785,8 +3785,8 @@
           </p:nvSpPr>
           <p:spPr>
             <a:xfrm>
-              <a:off x="3485318" y="1355474"/>
-              <a:ext cx="2374901" cy="1122340"/>
+              <a:off x="3997827" y="1771639"/>
+              <a:ext cx="2410549" cy="1139187"/>
             </a:xfrm>
             <a:prstGeom prst="roundRect">
               <a:avLst/>
@@ -3846,8 +3846,8 @@
           </p:nvGrpSpPr>
           <p:grpSpPr>
             <a:xfrm>
-              <a:off x="7153225" y="-1008583"/>
-              <a:ext cx="199646" cy="199646"/>
+              <a:off x="7720791" y="-837205"/>
+              <a:ext cx="202643" cy="202643"/>
               <a:chOff x="5654040" y="2072640"/>
               <a:chExt cx="653171" cy="653171"/>
             </a:xfrm>
@@ -3960,8 +3960,8 @@
           </p:nvSpPr>
           <p:spPr>
             <a:xfrm>
-              <a:off x="4794574" y="-1308512"/>
-              <a:ext cx="2374901" cy="369332"/>
+              <a:off x="5392744" y="-1480986"/>
+              <a:ext cx="2410549" cy="369332"/>
             </a:xfrm>
             <a:prstGeom prst="rect">
               <a:avLst/>
@@ -3995,8 +3995,8 @@
           </p:nvSpPr>
           <p:spPr>
             <a:xfrm>
-              <a:off x="2484705" y="-1637204"/>
-              <a:ext cx="2374901" cy="646331"/>
+              <a:off x="2982195" y="-1475262"/>
+              <a:ext cx="2410549" cy="646331"/>
             </a:xfrm>
             <a:prstGeom prst="rect">
               <a:avLst/>
@@ -4030,8 +4030,8 @@
           </p:nvGrpSpPr>
           <p:grpSpPr>
             <a:xfrm>
-              <a:off x="1943019" y="-1002707"/>
-              <a:ext cx="199646" cy="199646"/>
+              <a:off x="2432378" y="-831241"/>
+              <a:ext cx="202643" cy="202643"/>
               <a:chOff x="5654040" y="2072640"/>
               <a:chExt cx="653171" cy="653171"/>
             </a:xfrm>
@@ -4148,8 +4148,8 @@
           </p:nvCxnSpPr>
           <p:spPr>
             <a:xfrm flipH="1">
-              <a:off x="2142665" y="-908760"/>
-              <a:ext cx="2343270" cy="5876"/>
+              <a:off x="2635021" y="-735884"/>
+              <a:ext cx="2378443" cy="5964"/>
             </a:xfrm>
             <a:prstGeom prst="straightConnector1">
               <a:avLst/>
@@ -4191,8 +4191,8 @@
           </p:nvCxnSpPr>
           <p:spPr>
             <a:xfrm flipH="1">
-              <a:off x="4672770" y="-673233"/>
-              <a:ext cx="1" cy="309521"/>
+              <a:off x="5203104" y="-496822"/>
+              <a:ext cx="1" cy="314167"/>
             </a:xfrm>
             <a:prstGeom prst="straightConnector1">
               <a:avLst/>
@@ -4230,8 +4230,8 @@
           </p:nvGrpSpPr>
           <p:grpSpPr>
             <a:xfrm>
-              <a:off x="7153225" y="828812"/>
-              <a:ext cx="199646" cy="199646"/>
+              <a:off x="7720791" y="1027770"/>
+              <a:ext cx="202643" cy="202643"/>
               <a:chOff x="5654040" y="2072640"/>
               <a:chExt cx="653171" cy="653171"/>
             </a:xfrm>
@@ -4344,8 +4344,8 @@
           </p:nvSpPr>
           <p:spPr>
             <a:xfrm>
-              <a:off x="4485935" y="693108"/>
-              <a:ext cx="373671" cy="471054"/>
+              <a:off x="5013464" y="890029"/>
+              <a:ext cx="379280" cy="478125"/>
             </a:xfrm>
             <a:prstGeom prst="diamond">
               <a:avLst/>
@@ -4394,8 +4394,8 @@
           </p:nvCxnSpPr>
           <p:spPr>
             <a:xfrm>
-              <a:off x="4859606" y="928635"/>
-              <a:ext cx="2293619" cy="0"/>
+              <a:off x="5392744" y="1129091"/>
+              <a:ext cx="2328047" cy="0"/>
             </a:xfrm>
             <a:prstGeom prst="straightConnector1">
               <a:avLst/>
@@ -4437,8 +4437,8 @@
           </p:nvCxnSpPr>
           <p:spPr>
             <a:xfrm>
-              <a:off x="4672770" y="215408"/>
-              <a:ext cx="1" cy="477700"/>
+              <a:off x="5203104" y="405158"/>
+              <a:ext cx="1" cy="484870"/>
             </a:xfrm>
             <a:prstGeom prst="straightConnector1">
               <a:avLst/>
@@ -4476,8 +4476,8 @@
           </p:nvSpPr>
           <p:spPr>
             <a:xfrm>
-              <a:off x="5106971" y="508442"/>
-              <a:ext cx="2374901" cy="369332"/>
+              <a:off x="5643822" y="702591"/>
+              <a:ext cx="2410549" cy="369332"/>
             </a:xfrm>
             <a:prstGeom prst="rect">
               <a:avLst/>
@@ -4511,8 +4511,8 @@
           </p:nvSpPr>
           <p:spPr>
             <a:xfrm>
-              <a:off x="4672769" y="-763352"/>
-              <a:ext cx="2374901" cy="369332"/>
+              <a:off x="5203103" y="-588293"/>
+              <a:ext cx="2410549" cy="369332"/>
             </a:xfrm>
             <a:prstGeom prst="rect">
               <a:avLst/>
@@ -4550,8 +4550,8 @@
           </p:nvCxnSpPr>
           <p:spPr>
             <a:xfrm flipH="1">
-              <a:off x="4672769" y="1164162"/>
-              <a:ext cx="2" cy="191312"/>
+              <a:off x="5203102" y="1368154"/>
+              <a:ext cx="3" cy="403485"/>
             </a:xfrm>
             <a:prstGeom prst="straightConnector1">
               <a:avLst/>
@@ -4589,8 +4589,8 @@
           </p:nvSpPr>
           <p:spPr>
             <a:xfrm>
-              <a:off x="4745822" y="995956"/>
-              <a:ext cx="2374901" cy="369332"/>
+              <a:off x="5310242" y="1262480"/>
+              <a:ext cx="2410549" cy="369332"/>
             </a:xfrm>
             <a:prstGeom prst="rect">
               <a:avLst/>
@@ -4624,8 +4624,8 @@
           </p:nvSpPr>
           <p:spPr>
             <a:xfrm>
-              <a:off x="4485935" y="2997830"/>
-              <a:ext cx="373671" cy="471054"/>
+              <a:off x="5013464" y="3229345"/>
+              <a:ext cx="379280" cy="478125"/>
             </a:xfrm>
             <a:prstGeom prst="diamond">
               <a:avLst/>
@@ -4674,8 +4674,8 @@
           </p:nvCxnSpPr>
           <p:spPr>
             <a:xfrm>
-              <a:off x="4672769" y="2477814"/>
-              <a:ext cx="2" cy="520016"/>
+              <a:off x="5203102" y="2910826"/>
+              <a:ext cx="3" cy="318519"/>
             </a:xfrm>
             <a:prstGeom prst="straightConnector1">
               <a:avLst/>
@@ -4713,8 +4713,8 @@
           </p:nvGrpSpPr>
           <p:grpSpPr>
             <a:xfrm>
-              <a:off x="7153225" y="3133534"/>
-              <a:ext cx="199646" cy="199646"/>
+              <a:off x="7720791" y="3367086"/>
+              <a:ext cx="202643" cy="202643"/>
               <a:chOff x="5654040" y="2072640"/>
               <a:chExt cx="653171" cy="653171"/>
             </a:xfrm>
@@ -4831,8 +4831,8 @@
           </p:nvCxnSpPr>
           <p:spPr>
             <a:xfrm>
-              <a:off x="4859606" y="3233357"/>
-              <a:ext cx="2293619" cy="0"/>
+              <a:off x="5392744" y="3468408"/>
+              <a:ext cx="2328047" cy="0"/>
             </a:xfrm>
             <a:prstGeom prst="straightConnector1">
               <a:avLst/>
@@ -4870,8 +4870,8 @@
           </p:nvSpPr>
           <p:spPr>
             <a:xfrm>
-              <a:off x="5106971" y="2813164"/>
-              <a:ext cx="2374901" cy="369332"/>
+              <a:off x="5643822" y="3041908"/>
+              <a:ext cx="2410549" cy="369332"/>
             </a:xfrm>
             <a:prstGeom prst="rect">
               <a:avLst/>
@@ -4905,8 +4905,8 @@
           </p:nvSpPr>
           <p:spPr>
             <a:xfrm>
-              <a:off x="3485318" y="3884536"/>
-              <a:ext cx="2374901" cy="1122340"/>
+              <a:off x="3997828" y="4129361"/>
+              <a:ext cx="2410549" cy="1139187"/>
             </a:xfrm>
             <a:prstGeom prst="roundRect">
               <a:avLst/>
@@ -4970,8 +4970,8 @@
           </p:nvCxnSpPr>
           <p:spPr>
             <a:xfrm flipH="1">
-              <a:off x="4672769" y="3468884"/>
-              <a:ext cx="2" cy="415652"/>
+              <a:off x="5203103" y="3707470"/>
+              <a:ext cx="2" cy="421891"/>
             </a:xfrm>
             <a:prstGeom prst="straightConnector1">
               <a:avLst/>
@@ -5009,8 +5009,8 @@
           </p:nvSpPr>
           <p:spPr>
             <a:xfrm>
-              <a:off x="4760694" y="3425141"/>
-              <a:ext cx="748641" cy="369332"/>
+              <a:off x="5276982" y="3684064"/>
+              <a:ext cx="794236" cy="397365"/>
             </a:xfrm>
             <a:prstGeom prst="rect">
               <a:avLst/>
@@ -5044,8 +5044,8 @@
           </p:nvSpPr>
           <p:spPr>
             <a:xfrm>
-              <a:off x="3485317" y="5610940"/>
-              <a:ext cx="2374901" cy="1122340"/>
+              <a:off x="3997827" y="5881679"/>
+              <a:ext cx="2410549" cy="1139187"/>
             </a:xfrm>
             <a:prstGeom prst="roundRect">
               <a:avLst/>
@@ -5109,8 +5109,8 @@
           </p:nvCxnSpPr>
           <p:spPr>
             <a:xfrm flipH="1">
-              <a:off x="4672768" y="5006876"/>
-              <a:ext cx="1" cy="604064"/>
+              <a:off x="5203102" y="5268548"/>
+              <a:ext cx="1" cy="613131"/>
             </a:xfrm>
             <a:prstGeom prst="straightConnector1">
               <a:avLst/>
@@ -5148,8 +5148,8 @@
           </p:nvSpPr>
           <p:spPr>
             <a:xfrm>
-              <a:off x="4485935" y="7360898"/>
-              <a:ext cx="373671" cy="471054"/>
+              <a:off x="5013464" y="7657905"/>
+              <a:ext cx="379280" cy="478125"/>
             </a:xfrm>
             <a:prstGeom prst="diamond">
               <a:avLst/>
@@ -5198,8 +5198,8 @@
           </p:nvCxnSpPr>
           <p:spPr>
             <a:xfrm>
-              <a:off x="4672768" y="6733280"/>
-              <a:ext cx="3" cy="627618"/>
+              <a:off x="5203102" y="7020866"/>
+              <a:ext cx="3" cy="637039"/>
             </a:xfrm>
             <a:prstGeom prst="straightConnector1">
               <a:avLst/>
@@ -5241,8 +5241,8 @@
           </p:nvCxnSpPr>
           <p:spPr>
             <a:xfrm>
-              <a:off x="4859606" y="7596425"/>
-              <a:ext cx="2293619" cy="0"/>
+              <a:off x="5392744" y="7896967"/>
+              <a:ext cx="2328047" cy="0"/>
             </a:xfrm>
             <a:prstGeom prst="straightConnector1">
               <a:avLst/>
@@ -5280,8 +5280,8 @@
           </p:nvGrpSpPr>
           <p:grpSpPr>
             <a:xfrm>
-              <a:off x="7153225" y="7496602"/>
-              <a:ext cx="199646" cy="199646"/>
+              <a:off x="7720791" y="7795646"/>
+              <a:ext cx="202643" cy="202643"/>
               <a:chOff x="5654040" y="2072640"/>
               <a:chExt cx="653171" cy="653171"/>
             </a:xfrm>
@@ -5394,8 +5394,8 @@
           </p:nvSpPr>
           <p:spPr>
             <a:xfrm>
-              <a:off x="4945468" y="7125999"/>
-              <a:ext cx="2374901" cy="369332"/>
+              <a:off x="5479895" y="7419480"/>
+              <a:ext cx="2410549" cy="369332"/>
             </a:xfrm>
             <a:prstGeom prst="rect">
               <a:avLst/>
@@ -5429,8 +5429,8 @@
           </p:nvSpPr>
           <p:spPr>
             <a:xfrm>
-              <a:off x="3485317" y="8506907"/>
-              <a:ext cx="2374901" cy="1122340"/>
+              <a:off x="4003376" y="8580332"/>
+              <a:ext cx="2410549" cy="1139187"/>
             </a:xfrm>
             <a:prstGeom prst="roundRect">
               <a:avLst/>
@@ -5506,9 +5506,9 @@
             <p:nvPr/>
           </p:nvCxnSpPr>
           <p:spPr>
-            <a:xfrm flipH="1">
-              <a:off x="4672768" y="7831952"/>
-              <a:ext cx="3" cy="674955"/>
+            <a:xfrm>
+              <a:off x="5203105" y="8136030"/>
+              <a:ext cx="5546" cy="444303"/>
             </a:xfrm>
             <a:prstGeom prst="straightConnector1">
               <a:avLst/>
@@ -5546,8 +5546,8 @@
           </p:nvSpPr>
           <p:spPr>
             <a:xfrm>
-              <a:off x="4794574" y="8005278"/>
-              <a:ext cx="748636" cy="369332"/>
+              <a:off x="5479894" y="8090879"/>
+              <a:ext cx="2133757" cy="397365"/>
             </a:xfrm>
             <a:prstGeom prst="rect">
               <a:avLst/>
@@ -5581,8 +5581,8 @@
           </p:nvGrpSpPr>
           <p:grpSpPr>
             <a:xfrm>
-              <a:off x="4578412" y="10340082"/>
-              <a:ext cx="199646" cy="199646"/>
+              <a:off x="5107329" y="10681807"/>
+              <a:ext cx="202643" cy="202643"/>
               <a:chOff x="5654040" y="2072640"/>
               <a:chExt cx="653171" cy="653171"/>
             </a:xfrm>
@@ -5699,8 +5699,8 @@
           </p:nvCxnSpPr>
           <p:spPr>
             <a:xfrm>
-              <a:off x="4672768" y="9629247"/>
-              <a:ext cx="5467" cy="710835"/>
+              <a:off x="5208651" y="9719520"/>
+              <a:ext cx="0" cy="962287"/>
             </a:xfrm>
             <a:prstGeom prst="straightConnector1">
               <a:avLst/>
@@ -5738,8 +5738,8 @@
           </p:nvSpPr>
           <p:spPr>
             <a:xfrm>
-              <a:off x="1108986" y="-2278010"/>
-              <a:ext cx="1867710" cy="646331"/>
+              <a:off x="1585826" y="-2125687"/>
+              <a:ext cx="1895745" cy="646331"/>
             </a:xfrm>
             <a:prstGeom prst="rect">
               <a:avLst/>

</xml_diff>